<commit_message>
[변경사항] 1. Exit.ico 추가 2. Hot Key 추가 : Shortcut 열기 Win + Y 3. Shortcut 이 minimized in tray 상태에서 NotifyIcon을 double click 하면 Shortcut을 show 하도록 함    (Shortcut이 다른 application 뒤에 있을 때 double click을 하면 왜 앞으로 안나오는지 확인필요!) 4. Shortcut focused 상태에서 ESC key 누르면 Shortcut을 hide 하도록 함
[Version]
  - XML : -
  - AssemblyInfo : -
  - Install Package : -
</commit_message>
<xml_diff>
--- a/Resources/Icon.pptx
+++ b/Resources/Icon.pptx
@@ -6,6 +6,7 @@
   </p:sldMasterIdLst>
   <p:sldIdLst>
     <p:sldId id="256" r:id="rId2"/>
+    <p:sldId id="257" r:id="rId3"/>
   </p:sldIdLst>
   <p:sldSz cx="12192000" cy="6858000"/>
   <p:notesSz cx="6858000" cy="9144000"/>
@@ -243,7 +244,7 @@
           <a:p>
             <a:fld id="{D7F79187-E0C0-4F2A-A0F0-8B5DFD9CA2AA}" type="datetimeFigureOut">
               <a:rPr lang="ko-KR" altLang="en-US" smtClean="0"/>
-              <a:t>2019-04-19</a:t>
+              <a:t>2019-04-22</a:t>
             </a:fld>
             <a:endParaRPr lang="ko-KR" altLang="en-US"/>
           </a:p>
@@ -413,7 +414,7 @@
           <a:p>
             <a:fld id="{D7F79187-E0C0-4F2A-A0F0-8B5DFD9CA2AA}" type="datetimeFigureOut">
               <a:rPr lang="ko-KR" altLang="en-US" smtClean="0"/>
-              <a:t>2019-04-19</a:t>
+              <a:t>2019-04-22</a:t>
             </a:fld>
             <a:endParaRPr lang="ko-KR" altLang="en-US"/>
           </a:p>
@@ -593,7 +594,7 @@
           <a:p>
             <a:fld id="{D7F79187-E0C0-4F2A-A0F0-8B5DFD9CA2AA}" type="datetimeFigureOut">
               <a:rPr lang="ko-KR" altLang="en-US" smtClean="0"/>
-              <a:t>2019-04-19</a:t>
+              <a:t>2019-04-22</a:t>
             </a:fld>
             <a:endParaRPr lang="ko-KR" altLang="en-US"/>
           </a:p>
@@ -763,7 +764,7 @@
           <a:p>
             <a:fld id="{D7F79187-E0C0-4F2A-A0F0-8B5DFD9CA2AA}" type="datetimeFigureOut">
               <a:rPr lang="ko-KR" altLang="en-US" smtClean="0"/>
-              <a:t>2019-04-19</a:t>
+              <a:t>2019-04-22</a:t>
             </a:fld>
             <a:endParaRPr lang="ko-KR" altLang="en-US"/>
           </a:p>
@@ -1009,7 +1010,7 @@
           <a:p>
             <a:fld id="{D7F79187-E0C0-4F2A-A0F0-8B5DFD9CA2AA}" type="datetimeFigureOut">
               <a:rPr lang="ko-KR" altLang="en-US" smtClean="0"/>
-              <a:t>2019-04-19</a:t>
+              <a:t>2019-04-22</a:t>
             </a:fld>
             <a:endParaRPr lang="ko-KR" altLang="en-US"/>
           </a:p>
@@ -1241,7 +1242,7 @@
           <a:p>
             <a:fld id="{D7F79187-E0C0-4F2A-A0F0-8B5DFD9CA2AA}" type="datetimeFigureOut">
               <a:rPr lang="ko-KR" altLang="en-US" smtClean="0"/>
-              <a:t>2019-04-19</a:t>
+              <a:t>2019-04-22</a:t>
             </a:fld>
             <a:endParaRPr lang="ko-KR" altLang="en-US"/>
           </a:p>
@@ -1608,7 +1609,7 @@
           <a:p>
             <a:fld id="{D7F79187-E0C0-4F2A-A0F0-8B5DFD9CA2AA}" type="datetimeFigureOut">
               <a:rPr lang="ko-KR" altLang="en-US" smtClean="0"/>
-              <a:t>2019-04-19</a:t>
+              <a:t>2019-04-22</a:t>
             </a:fld>
             <a:endParaRPr lang="ko-KR" altLang="en-US"/>
           </a:p>
@@ -1726,7 +1727,7 @@
           <a:p>
             <a:fld id="{D7F79187-E0C0-4F2A-A0F0-8B5DFD9CA2AA}" type="datetimeFigureOut">
               <a:rPr lang="ko-KR" altLang="en-US" smtClean="0"/>
-              <a:t>2019-04-19</a:t>
+              <a:t>2019-04-22</a:t>
             </a:fld>
             <a:endParaRPr lang="ko-KR" altLang="en-US"/>
           </a:p>
@@ -1821,7 +1822,7 @@
           <a:p>
             <a:fld id="{D7F79187-E0C0-4F2A-A0F0-8B5DFD9CA2AA}" type="datetimeFigureOut">
               <a:rPr lang="ko-KR" altLang="en-US" smtClean="0"/>
-              <a:t>2019-04-19</a:t>
+              <a:t>2019-04-22</a:t>
             </a:fld>
             <a:endParaRPr lang="ko-KR" altLang="en-US"/>
           </a:p>
@@ -2098,7 +2099,7 @@
           <a:p>
             <a:fld id="{D7F79187-E0C0-4F2A-A0F0-8B5DFD9CA2AA}" type="datetimeFigureOut">
               <a:rPr lang="ko-KR" altLang="en-US" smtClean="0"/>
-              <a:t>2019-04-19</a:t>
+              <a:t>2019-04-22</a:t>
             </a:fld>
             <a:endParaRPr lang="ko-KR" altLang="en-US"/>
           </a:p>
@@ -2351,7 +2352,7 @@
           <a:p>
             <a:fld id="{D7F79187-E0C0-4F2A-A0F0-8B5DFD9CA2AA}" type="datetimeFigureOut">
               <a:rPr lang="ko-KR" altLang="en-US" smtClean="0"/>
-              <a:t>2019-04-19</a:t>
+              <a:t>2019-04-22</a:t>
             </a:fld>
             <a:endParaRPr lang="ko-KR" altLang="en-US"/>
           </a:p>
@@ -2564,7 +2565,7 @@
           <a:p>
             <a:fld id="{D7F79187-E0C0-4F2A-A0F0-8B5DFD9CA2AA}" type="datetimeFigureOut">
               <a:rPr lang="ko-KR" altLang="en-US" smtClean="0"/>
-              <a:t>2019-04-19</a:t>
+              <a:t>2019-04-22</a:t>
             </a:fld>
             <a:endParaRPr lang="ko-KR" altLang="en-US"/>
           </a:p>
@@ -3111,6 +3112,189 @@
 </p:sld>
 </file>
 
+<file path=ppt/slides/slide2.xml><?xml version="1.0" encoding="utf-8"?>
+<p:sld xmlns:a="http://schemas.openxmlformats.org/drawingml/2006/main" xmlns:r="http://schemas.openxmlformats.org/officeDocument/2006/relationships" xmlns:p="http://schemas.openxmlformats.org/presentationml/2006/main">
+  <p:cSld>
+    <p:spTree>
+      <p:nvGrpSpPr>
+        <p:cNvPr id="1" name=""/>
+        <p:cNvGrpSpPr/>
+        <p:nvPr/>
+      </p:nvGrpSpPr>
+      <p:grpSpPr>
+        <a:xfrm>
+          <a:off x="0" y="0"/>
+          <a:ext cx="0" cy="0"/>
+          <a:chOff x="0" y="0"/>
+          <a:chExt cx="0" cy="0"/>
+        </a:xfrm>
+      </p:grpSpPr>
+      <p:grpSp>
+        <p:nvGrpSpPr>
+          <p:cNvPr id="11" name="그룹 10"/>
+          <p:cNvGrpSpPr/>
+          <p:nvPr/>
+        </p:nvGrpSpPr>
+        <p:grpSpPr>
+          <a:xfrm>
+            <a:off x="2875129" y="208129"/>
+            <a:ext cx="6441743" cy="6441743"/>
+            <a:chOff x="2875129" y="208129"/>
+            <a:chExt cx="6441743" cy="6441743"/>
+          </a:xfrm>
+        </p:grpSpPr>
+        <p:sp>
+          <p:nvSpPr>
+            <p:cNvPr id="5" name="직사각형 4"/>
+            <p:cNvSpPr/>
+            <p:nvPr/>
+          </p:nvSpPr>
+          <p:spPr>
+            <a:xfrm>
+              <a:off x="2875129" y="208129"/>
+              <a:ext cx="6441743" cy="6441743"/>
+            </a:xfrm>
+            <a:prstGeom prst="rect">
+              <a:avLst/>
+            </a:prstGeom>
+            <a:noFill/>
+            <a:ln w="190500">
+              <a:solidFill>
+                <a:schemeClr val="bg1"/>
+              </a:solidFill>
+            </a:ln>
+          </p:spPr>
+          <p:style>
+            <a:lnRef idx="2">
+              <a:schemeClr val="accent1">
+                <a:shade val="50000"/>
+              </a:schemeClr>
+            </a:lnRef>
+            <a:fillRef idx="1">
+              <a:schemeClr val="accent1"/>
+            </a:fillRef>
+            <a:effectRef idx="0">
+              <a:schemeClr val="accent1"/>
+            </a:effectRef>
+            <a:fontRef idx="minor">
+              <a:schemeClr val="lt1"/>
+            </a:fontRef>
+          </p:style>
+          <p:txBody>
+            <a:bodyPr rtlCol="0" anchor="ctr"/>
+            <a:lstStyle/>
+            <a:p>
+              <a:pPr algn="ctr"/>
+              <a:endParaRPr lang="ko-KR" altLang="en-US"/>
+            </a:p>
+          </p:txBody>
+        </p:sp>
+        <p:sp>
+          <p:nvSpPr>
+            <p:cNvPr id="7" name="직사각형 6"/>
+            <p:cNvSpPr/>
+            <p:nvPr/>
+          </p:nvSpPr>
+          <p:spPr>
+            <a:xfrm rot="2700000">
+              <a:off x="3315854" y="3143264"/>
+              <a:ext cx="5347855" cy="571472"/>
+            </a:xfrm>
+            <a:prstGeom prst="rect">
+              <a:avLst/>
+            </a:prstGeom>
+            <a:solidFill>
+              <a:srgbClr val="FF0000"/>
+            </a:solidFill>
+            <a:ln>
+              <a:noFill/>
+            </a:ln>
+          </p:spPr>
+          <p:style>
+            <a:lnRef idx="2">
+              <a:schemeClr val="accent1">
+                <a:shade val="50000"/>
+              </a:schemeClr>
+            </a:lnRef>
+            <a:fillRef idx="1">
+              <a:schemeClr val="accent1"/>
+            </a:fillRef>
+            <a:effectRef idx="0">
+              <a:schemeClr val="accent1"/>
+            </a:effectRef>
+            <a:fontRef idx="minor">
+              <a:schemeClr val="lt1"/>
+            </a:fontRef>
+          </p:style>
+          <p:txBody>
+            <a:bodyPr rtlCol="0" anchor="ctr"/>
+            <a:lstStyle/>
+            <a:p>
+              <a:pPr algn="ctr"/>
+              <a:endParaRPr lang="ko-KR" altLang="en-US"/>
+            </a:p>
+          </p:txBody>
+        </p:sp>
+        <p:sp>
+          <p:nvSpPr>
+            <p:cNvPr id="10" name="직사각형 9"/>
+            <p:cNvSpPr/>
+            <p:nvPr/>
+          </p:nvSpPr>
+          <p:spPr>
+            <a:xfrm rot="18900000" flipV="1">
+              <a:off x="3315853" y="3143266"/>
+              <a:ext cx="5347855" cy="571472"/>
+            </a:xfrm>
+            <a:prstGeom prst="rect">
+              <a:avLst/>
+            </a:prstGeom>
+            <a:solidFill>
+              <a:srgbClr val="FF0000"/>
+            </a:solidFill>
+            <a:ln>
+              <a:noFill/>
+            </a:ln>
+          </p:spPr>
+          <p:style>
+            <a:lnRef idx="2">
+              <a:schemeClr val="accent1">
+                <a:shade val="50000"/>
+              </a:schemeClr>
+            </a:lnRef>
+            <a:fillRef idx="1">
+              <a:schemeClr val="accent1"/>
+            </a:fillRef>
+            <a:effectRef idx="0">
+              <a:schemeClr val="accent1"/>
+            </a:effectRef>
+            <a:fontRef idx="minor">
+              <a:schemeClr val="lt1"/>
+            </a:fontRef>
+          </p:style>
+          <p:txBody>
+            <a:bodyPr rtlCol="0" anchor="ctr"/>
+            <a:lstStyle/>
+            <a:p>
+              <a:pPr algn="ctr"/>
+              <a:endParaRPr lang="ko-KR" altLang="en-US"/>
+            </a:p>
+          </p:txBody>
+        </p:sp>
+      </p:grpSp>
+    </p:spTree>
+    <p:extLst>
+      <p:ext uri="{BB962C8B-B14F-4D97-AF65-F5344CB8AC3E}">
+        <p14:creationId xmlns:p14="http://schemas.microsoft.com/office/powerpoint/2010/main" val="2931150856"/>
+      </p:ext>
+    </p:extLst>
+  </p:cSld>
+  <p:clrMapOvr>
+    <a:masterClrMapping/>
+  </p:clrMapOvr>
+</p:sld>
+</file>
+
 <file path=ppt/theme/theme1.xml><?xml version="1.0" encoding="utf-8"?>
 <a:theme xmlns:a="http://schemas.openxmlformats.org/drawingml/2006/main" name="Office 테마">
   <a:themeElements>

</xml_diff>

<commit_message>
[변경사항] * Option 기능추가   - Show in taskbar   - Minimize to tray after run.
* FrmMain이 minimize된 상태에서 Win+Y에도 top으로 안나오던 현상 수정

[Version]
  - XML : 0.2.0
  - AssemblyInfo : 0.2.0
  - Install Package : 0.2.0
</commit_message>
<xml_diff>
--- a/Resources/Icon.pptx
+++ b/Resources/Icon.pptx
@@ -7,6 +7,7 @@
   <p:sldIdLst>
     <p:sldId id="256" r:id="rId2"/>
     <p:sldId id="257" r:id="rId3"/>
+    <p:sldId id="258" r:id="rId4"/>
   </p:sldIdLst>
   <p:sldSz cx="12192000" cy="6858000"/>
   <p:notesSz cx="6858000" cy="9144000"/>
@@ -244,7 +245,7 @@
           <a:p>
             <a:fld id="{D7F79187-E0C0-4F2A-A0F0-8B5DFD9CA2AA}" type="datetimeFigureOut">
               <a:rPr lang="ko-KR" altLang="en-US" smtClean="0"/>
-              <a:t>2019-04-22</a:t>
+              <a:t>2019-04-23</a:t>
             </a:fld>
             <a:endParaRPr lang="ko-KR" altLang="en-US"/>
           </a:p>
@@ -414,7 +415,7 @@
           <a:p>
             <a:fld id="{D7F79187-E0C0-4F2A-A0F0-8B5DFD9CA2AA}" type="datetimeFigureOut">
               <a:rPr lang="ko-KR" altLang="en-US" smtClean="0"/>
-              <a:t>2019-04-22</a:t>
+              <a:t>2019-04-23</a:t>
             </a:fld>
             <a:endParaRPr lang="ko-KR" altLang="en-US"/>
           </a:p>
@@ -594,7 +595,7 @@
           <a:p>
             <a:fld id="{D7F79187-E0C0-4F2A-A0F0-8B5DFD9CA2AA}" type="datetimeFigureOut">
               <a:rPr lang="ko-KR" altLang="en-US" smtClean="0"/>
-              <a:t>2019-04-22</a:t>
+              <a:t>2019-04-23</a:t>
             </a:fld>
             <a:endParaRPr lang="ko-KR" altLang="en-US"/>
           </a:p>
@@ -764,7 +765,7 @@
           <a:p>
             <a:fld id="{D7F79187-E0C0-4F2A-A0F0-8B5DFD9CA2AA}" type="datetimeFigureOut">
               <a:rPr lang="ko-KR" altLang="en-US" smtClean="0"/>
-              <a:t>2019-04-22</a:t>
+              <a:t>2019-04-23</a:t>
             </a:fld>
             <a:endParaRPr lang="ko-KR" altLang="en-US"/>
           </a:p>
@@ -1010,7 +1011,7 @@
           <a:p>
             <a:fld id="{D7F79187-E0C0-4F2A-A0F0-8B5DFD9CA2AA}" type="datetimeFigureOut">
               <a:rPr lang="ko-KR" altLang="en-US" smtClean="0"/>
-              <a:t>2019-04-22</a:t>
+              <a:t>2019-04-23</a:t>
             </a:fld>
             <a:endParaRPr lang="ko-KR" altLang="en-US"/>
           </a:p>
@@ -1242,7 +1243,7 @@
           <a:p>
             <a:fld id="{D7F79187-E0C0-4F2A-A0F0-8B5DFD9CA2AA}" type="datetimeFigureOut">
               <a:rPr lang="ko-KR" altLang="en-US" smtClean="0"/>
-              <a:t>2019-04-22</a:t>
+              <a:t>2019-04-23</a:t>
             </a:fld>
             <a:endParaRPr lang="ko-KR" altLang="en-US"/>
           </a:p>
@@ -1609,7 +1610,7 @@
           <a:p>
             <a:fld id="{D7F79187-E0C0-4F2A-A0F0-8B5DFD9CA2AA}" type="datetimeFigureOut">
               <a:rPr lang="ko-KR" altLang="en-US" smtClean="0"/>
-              <a:t>2019-04-22</a:t>
+              <a:t>2019-04-23</a:t>
             </a:fld>
             <a:endParaRPr lang="ko-KR" altLang="en-US"/>
           </a:p>
@@ -1727,7 +1728,7 @@
           <a:p>
             <a:fld id="{D7F79187-E0C0-4F2A-A0F0-8B5DFD9CA2AA}" type="datetimeFigureOut">
               <a:rPr lang="ko-KR" altLang="en-US" smtClean="0"/>
-              <a:t>2019-04-22</a:t>
+              <a:t>2019-04-23</a:t>
             </a:fld>
             <a:endParaRPr lang="ko-KR" altLang="en-US"/>
           </a:p>
@@ -1822,7 +1823,7 @@
           <a:p>
             <a:fld id="{D7F79187-E0C0-4F2A-A0F0-8B5DFD9CA2AA}" type="datetimeFigureOut">
               <a:rPr lang="ko-KR" altLang="en-US" smtClean="0"/>
-              <a:t>2019-04-22</a:t>
+              <a:t>2019-04-23</a:t>
             </a:fld>
             <a:endParaRPr lang="ko-KR" altLang="en-US"/>
           </a:p>
@@ -2099,7 +2100,7 @@
           <a:p>
             <a:fld id="{D7F79187-E0C0-4F2A-A0F0-8B5DFD9CA2AA}" type="datetimeFigureOut">
               <a:rPr lang="ko-KR" altLang="en-US" smtClean="0"/>
-              <a:t>2019-04-22</a:t>
+              <a:t>2019-04-23</a:t>
             </a:fld>
             <a:endParaRPr lang="ko-KR" altLang="en-US"/>
           </a:p>
@@ -2352,7 +2353,7 @@
           <a:p>
             <a:fld id="{D7F79187-E0C0-4F2A-A0F0-8B5DFD9CA2AA}" type="datetimeFigureOut">
               <a:rPr lang="ko-KR" altLang="en-US" smtClean="0"/>
-              <a:t>2019-04-22</a:t>
+              <a:t>2019-04-23</a:t>
             </a:fld>
             <a:endParaRPr lang="ko-KR" altLang="en-US"/>
           </a:p>
@@ -2565,7 +2566,7 @@
           <a:p>
             <a:fld id="{D7F79187-E0C0-4F2A-A0F0-8B5DFD9CA2AA}" type="datetimeFigureOut">
               <a:rPr lang="ko-KR" altLang="en-US" smtClean="0"/>
-              <a:t>2019-04-22</a:t>
+              <a:t>2019-04-23</a:t>
             </a:fld>
             <a:endParaRPr lang="ko-KR" altLang="en-US"/>
           </a:p>
@@ -3295,6 +3296,718 @@
 </p:sld>
 </file>
 
+<file path=ppt/slides/slide3.xml><?xml version="1.0" encoding="utf-8"?>
+<p:sld xmlns:a="http://schemas.openxmlformats.org/drawingml/2006/main" xmlns:r="http://schemas.openxmlformats.org/officeDocument/2006/relationships" xmlns:p="http://schemas.openxmlformats.org/presentationml/2006/main">
+  <p:cSld>
+    <p:spTree>
+      <p:nvGrpSpPr>
+        <p:cNvPr id="1" name=""/>
+        <p:cNvGrpSpPr/>
+        <p:nvPr/>
+      </p:nvGrpSpPr>
+      <p:grpSpPr>
+        <a:xfrm>
+          <a:off x="0" y="0"/>
+          <a:ext cx="0" cy="0"/>
+          <a:chOff x="0" y="0"/>
+          <a:chExt cx="0" cy="0"/>
+        </a:xfrm>
+      </p:grpSpPr>
+      <p:grpSp>
+        <p:nvGrpSpPr>
+          <p:cNvPr id="3" name="그룹 2"/>
+          <p:cNvGrpSpPr/>
+          <p:nvPr/>
+        </p:nvGrpSpPr>
+        <p:grpSpPr>
+          <a:xfrm>
+            <a:off x="2875129" y="208129"/>
+            <a:ext cx="6441743" cy="6441743"/>
+            <a:chOff x="2875129" y="208129"/>
+            <a:chExt cx="6441743" cy="6441743"/>
+          </a:xfrm>
+        </p:grpSpPr>
+        <p:sp>
+          <p:nvSpPr>
+            <p:cNvPr id="5" name="직사각형 4"/>
+            <p:cNvSpPr/>
+            <p:nvPr/>
+          </p:nvSpPr>
+          <p:spPr>
+            <a:xfrm>
+              <a:off x="2875129" y="208129"/>
+              <a:ext cx="6441743" cy="6441743"/>
+            </a:xfrm>
+            <a:prstGeom prst="rect">
+              <a:avLst/>
+            </a:prstGeom>
+            <a:noFill/>
+            <a:ln w="190500">
+              <a:solidFill>
+                <a:schemeClr val="bg1"/>
+              </a:solidFill>
+            </a:ln>
+          </p:spPr>
+          <p:style>
+            <a:lnRef idx="2">
+              <a:schemeClr val="accent1">
+                <a:shade val="50000"/>
+              </a:schemeClr>
+            </a:lnRef>
+            <a:fillRef idx="1">
+              <a:schemeClr val="accent1"/>
+            </a:fillRef>
+            <a:effectRef idx="0">
+              <a:schemeClr val="accent1"/>
+            </a:effectRef>
+            <a:fontRef idx="minor">
+              <a:schemeClr val="lt1"/>
+            </a:fontRef>
+          </p:style>
+          <p:txBody>
+            <a:bodyPr rtlCol="0" anchor="ctr"/>
+            <a:lstStyle/>
+            <a:p>
+              <a:pPr algn="ctr"/>
+              <a:endParaRPr lang="ko-KR" altLang="en-US"/>
+            </a:p>
+          </p:txBody>
+        </p:sp>
+        <p:grpSp>
+          <p:nvGrpSpPr>
+            <p:cNvPr id="2" name="그룹 1"/>
+            <p:cNvGrpSpPr/>
+            <p:nvPr/>
+          </p:nvGrpSpPr>
+          <p:grpSpPr>
+            <a:xfrm>
+              <a:off x="3569854" y="902853"/>
+              <a:ext cx="5052291" cy="5052291"/>
+              <a:chOff x="3569854" y="902853"/>
+              <a:chExt cx="5052291" cy="5052291"/>
+            </a:xfrm>
+          </p:grpSpPr>
+          <p:sp>
+            <p:nvSpPr>
+              <p:cNvPr id="15" name="자유형 14"/>
+              <p:cNvSpPr/>
+              <p:nvPr/>
+            </p:nvSpPr>
+            <p:spPr>
+              <a:xfrm rot="5400000">
+                <a:off x="3569854" y="902853"/>
+                <a:ext cx="5052291" cy="5052291"/>
+              </a:xfrm>
+              <a:custGeom>
+                <a:avLst/>
+                <a:gdLst>
+                  <a:gd name="connsiteX0" fmla="*/ 0 w 5052291"/>
+                  <a:gd name="connsiteY0" fmla="*/ 2752437 h 5052291"/>
+                  <a:gd name="connsiteX1" fmla="*/ 0 w 5052291"/>
+                  <a:gd name="connsiteY1" fmla="*/ 2299856 h 5052291"/>
+                  <a:gd name="connsiteX2" fmla="*/ 472461 w 5052291"/>
+                  <a:gd name="connsiteY2" fmla="*/ 2299856 h 5052291"/>
+                  <a:gd name="connsiteX3" fmla="*/ 501490 w 5052291"/>
+                  <a:gd name="connsiteY3" fmla="*/ 2109648 h 5052291"/>
+                  <a:gd name="connsiteX4" fmla="*/ 812453 w 5052291"/>
+                  <a:gd name="connsiteY4" fmla="*/ 1370670 h 5052291"/>
+                  <a:gd name="connsiteX5" fmla="*/ 914363 w 5052291"/>
+                  <a:gd name="connsiteY5" fmla="*/ 1234388 h 5052291"/>
+                  <a:gd name="connsiteX6" fmla="*/ 579878 w 5052291"/>
+                  <a:gd name="connsiteY6" fmla="*/ 899903 h 5052291"/>
+                  <a:gd name="connsiteX7" fmla="*/ 899901 w 5052291"/>
+                  <a:gd name="connsiteY7" fmla="*/ 579880 h 5052291"/>
+                  <a:gd name="connsiteX8" fmla="*/ 1234386 w 5052291"/>
+                  <a:gd name="connsiteY8" fmla="*/ 914365 h 5052291"/>
+                  <a:gd name="connsiteX9" fmla="*/ 1370665 w 5052291"/>
+                  <a:gd name="connsiteY9" fmla="*/ 812457 h 5052291"/>
+                  <a:gd name="connsiteX10" fmla="*/ 2211414 w 5052291"/>
+                  <a:gd name="connsiteY10" fmla="*/ 483320 h 5052291"/>
+                  <a:gd name="connsiteX11" fmla="*/ 2299856 w 5052291"/>
+                  <a:gd name="connsiteY11" fmla="*/ 473218 h 5052291"/>
+                  <a:gd name="connsiteX12" fmla="*/ 2299856 w 5052291"/>
+                  <a:gd name="connsiteY12" fmla="*/ 0 h 5052291"/>
+                  <a:gd name="connsiteX13" fmla="*/ 2752437 w 5052291"/>
+                  <a:gd name="connsiteY13" fmla="*/ 0 h 5052291"/>
+                  <a:gd name="connsiteX14" fmla="*/ 2752437 w 5052291"/>
+                  <a:gd name="connsiteY14" fmla="*/ 473250 h 5052291"/>
+                  <a:gd name="connsiteX15" fmla="*/ 2847283 w 5052291"/>
+                  <a:gd name="connsiteY15" fmla="*/ 484310 h 5052291"/>
+                  <a:gd name="connsiteX16" fmla="*/ 3702148 w 5052291"/>
+                  <a:gd name="connsiteY16" fmla="*/ 826505 h 5052291"/>
+                  <a:gd name="connsiteX17" fmla="*/ 3818024 w 5052291"/>
+                  <a:gd name="connsiteY17" fmla="*/ 914244 h 5052291"/>
+                  <a:gd name="connsiteX18" fmla="*/ 4152388 w 5052291"/>
+                  <a:gd name="connsiteY18" fmla="*/ 579881 h 5052291"/>
+                  <a:gd name="connsiteX19" fmla="*/ 4472411 w 5052291"/>
+                  <a:gd name="connsiteY19" fmla="*/ 899904 h 5052291"/>
+                  <a:gd name="connsiteX20" fmla="*/ 4137477 w 5052291"/>
+                  <a:gd name="connsiteY20" fmla="*/ 1234838 h 5052291"/>
+                  <a:gd name="connsiteX21" fmla="*/ 4196975 w 5052291"/>
+                  <a:gd name="connsiteY21" fmla="*/ 1309629 h 5052291"/>
+                  <a:gd name="connsiteX22" fmla="*/ 4550797 w 5052291"/>
+                  <a:gd name="connsiteY22" fmla="*/ 2109648 h 5052291"/>
+                  <a:gd name="connsiteX23" fmla="*/ 4579826 w 5052291"/>
+                  <a:gd name="connsiteY23" fmla="*/ 2299856 h 5052291"/>
+                  <a:gd name="connsiteX24" fmla="*/ 5052291 w 5052291"/>
+                  <a:gd name="connsiteY24" fmla="*/ 2299856 h 5052291"/>
+                  <a:gd name="connsiteX25" fmla="*/ 5052291 w 5052291"/>
+                  <a:gd name="connsiteY25" fmla="*/ 2752437 h 5052291"/>
+                  <a:gd name="connsiteX26" fmla="*/ 4579826 w 5052291"/>
+                  <a:gd name="connsiteY26" fmla="*/ 2752437 h 5052291"/>
+                  <a:gd name="connsiteX27" fmla="*/ 4550797 w 5052291"/>
+                  <a:gd name="connsiteY27" fmla="*/ 2942648 h 5052291"/>
+                  <a:gd name="connsiteX28" fmla="*/ 4239834 w 5052291"/>
+                  <a:gd name="connsiteY28" fmla="*/ 3681626 h 5052291"/>
+                  <a:gd name="connsiteX29" fmla="*/ 4137926 w 5052291"/>
+                  <a:gd name="connsiteY29" fmla="*/ 3817906 h 5052291"/>
+                  <a:gd name="connsiteX30" fmla="*/ 4472410 w 5052291"/>
+                  <a:gd name="connsiteY30" fmla="*/ 4152390 h 5052291"/>
+                  <a:gd name="connsiteX31" fmla="*/ 4152387 w 5052291"/>
+                  <a:gd name="connsiteY31" fmla="*/ 4472413 h 5052291"/>
+                  <a:gd name="connsiteX32" fmla="*/ 3817903 w 5052291"/>
+                  <a:gd name="connsiteY32" fmla="*/ 4137929 h 5052291"/>
+                  <a:gd name="connsiteX33" fmla="*/ 3681621 w 5052291"/>
+                  <a:gd name="connsiteY33" fmla="*/ 4239839 h 5052291"/>
+                  <a:gd name="connsiteX34" fmla="*/ 2840872 w 5052291"/>
+                  <a:gd name="connsiteY34" fmla="*/ 4568976 h 5052291"/>
+                  <a:gd name="connsiteX35" fmla="*/ 2752437 w 5052291"/>
+                  <a:gd name="connsiteY35" fmla="*/ 4579077 h 5052291"/>
+                  <a:gd name="connsiteX36" fmla="*/ 2752437 w 5052291"/>
+                  <a:gd name="connsiteY36" fmla="*/ 5052291 h 5052291"/>
+                  <a:gd name="connsiteX37" fmla="*/ 2299856 w 5052291"/>
+                  <a:gd name="connsiteY37" fmla="*/ 5052291 h 5052291"/>
+                  <a:gd name="connsiteX38" fmla="*/ 2299856 w 5052291"/>
+                  <a:gd name="connsiteY38" fmla="*/ 4579047 h 5052291"/>
+                  <a:gd name="connsiteX39" fmla="*/ 2205004 w 5052291"/>
+                  <a:gd name="connsiteY39" fmla="*/ 4567986 h 5052291"/>
+                  <a:gd name="connsiteX40" fmla="*/ 1350139 w 5052291"/>
+                  <a:gd name="connsiteY40" fmla="*/ 4225791 h 5052291"/>
+                  <a:gd name="connsiteX41" fmla="*/ 1234263 w 5052291"/>
+                  <a:gd name="connsiteY41" fmla="*/ 4138052 h 5052291"/>
+                  <a:gd name="connsiteX42" fmla="*/ 899902 w 5052291"/>
+                  <a:gd name="connsiteY42" fmla="*/ 4472414 h 5052291"/>
+                  <a:gd name="connsiteX43" fmla="*/ 579879 w 5052291"/>
+                  <a:gd name="connsiteY43" fmla="*/ 4152391 h 5052291"/>
+                  <a:gd name="connsiteX44" fmla="*/ 914811 w 5052291"/>
+                  <a:gd name="connsiteY44" fmla="*/ 3817459 h 5052291"/>
+                  <a:gd name="connsiteX45" fmla="*/ 855312 w 5052291"/>
+                  <a:gd name="connsiteY45" fmla="*/ 3742667 h 5052291"/>
+                  <a:gd name="connsiteX46" fmla="*/ 501490 w 5052291"/>
+                  <a:gd name="connsiteY46" fmla="*/ 2942648 h 5052291"/>
+                  <a:gd name="connsiteX47" fmla="*/ 472461 w 5052291"/>
+                  <a:gd name="connsiteY47" fmla="*/ 2752437 h 5052291"/>
+                </a:gdLst>
+                <a:ahLst/>
+                <a:cxnLst>
+                  <a:cxn ang="0">
+                    <a:pos x="connsiteX0" y="connsiteY0"/>
+                  </a:cxn>
+                  <a:cxn ang="0">
+                    <a:pos x="connsiteX1" y="connsiteY1"/>
+                  </a:cxn>
+                  <a:cxn ang="0">
+                    <a:pos x="connsiteX2" y="connsiteY2"/>
+                  </a:cxn>
+                  <a:cxn ang="0">
+                    <a:pos x="connsiteX3" y="connsiteY3"/>
+                  </a:cxn>
+                  <a:cxn ang="0">
+                    <a:pos x="connsiteX4" y="connsiteY4"/>
+                  </a:cxn>
+                  <a:cxn ang="0">
+                    <a:pos x="connsiteX5" y="connsiteY5"/>
+                  </a:cxn>
+                  <a:cxn ang="0">
+                    <a:pos x="connsiteX6" y="connsiteY6"/>
+                  </a:cxn>
+                  <a:cxn ang="0">
+                    <a:pos x="connsiteX7" y="connsiteY7"/>
+                  </a:cxn>
+                  <a:cxn ang="0">
+                    <a:pos x="connsiteX8" y="connsiteY8"/>
+                  </a:cxn>
+                  <a:cxn ang="0">
+                    <a:pos x="connsiteX9" y="connsiteY9"/>
+                  </a:cxn>
+                  <a:cxn ang="0">
+                    <a:pos x="connsiteX10" y="connsiteY10"/>
+                  </a:cxn>
+                  <a:cxn ang="0">
+                    <a:pos x="connsiteX11" y="connsiteY11"/>
+                  </a:cxn>
+                  <a:cxn ang="0">
+                    <a:pos x="connsiteX12" y="connsiteY12"/>
+                  </a:cxn>
+                  <a:cxn ang="0">
+                    <a:pos x="connsiteX13" y="connsiteY13"/>
+                  </a:cxn>
+                  <a:cxn ang="0">
+                    <a:pos x="connsiteX14" y="connsiteY14"/>
+                  </a:cxn>
+                  <a:cxn ang="0">
+                    <a:pos x="connsiteX15" y="connsiteY15"/>
+                  </a:cxn>
+                  <a:cxn ang="0">
+                    <a:pos x="connsiteX16" y="connsiteY16"/>
+                  </a:cxn>
+                  <a:cxn ang="0">
+                    <a:pos x="connsiteX17" y="connsiteY17"/>
+                  </a:cxn>
+                  <a:cxn ang="0">
+                    <a:pos x="connsiteX18" y="connsiteY18"/>
+                  </a:cxn>
+                  <a:cxn ang="0">
+                    <a:pos x="connsiteX19" y="connsiteY19"/>
+                  </a:cxn>
+                  <a:cxn ang="0">
+                    <a:pos x="connsiteX20" y="connsiteY20"/>
+                  </a:cxn>
+                  <a:cxn ang="0">
+                    <a:pos x="connsiteX21" y="connsiteY21"/>
+                  </a:cxn>
+                  <a:cxn ang="0">
+                    <a:pos x="connsiteX22" y="connsiteY22"/>
+                  </a:cxn>
+                  <a:cxn ang="0">
+                    <a:pos x="connsiteX23" y="connsiteY23"/>
+                  </a:cxn>
+                  <a:cxn ang="0">
+                    <a:pos x="connsiteX24" y="connsiteY24"/>
+                  </a:cxn>
+                  <a:cxn ang="0">
+                    <a:pos x="connsiteX25" y="connsiteY25"/>
+                  </a:cxn>
+                  <a:cxn ang="0">
+                    <a:pos x="connsiteX26" y="connsiteY26"/>
+                  </a:cxn>
+                  <a:cxn ang="0">
+                    <a:pos x="connsiteX27" y="connsiteY27"/>
+                  </a:cxn>
+                  <a:cxn ang="0">
+                    <a:pos x="connsiteX28" y="connsiteY28"/>
+                  </a:cxn>
+                  <a:cxn ang="0">
+                    <a:pos x="connsiteX29" y="connsiteY29"/>
+                  </a:cxn>
+                  <a:cxn ang="0">
+                    <a:pos x="connsiteX30" y="connsiteY30"/>
+                  </a:cxn>
+                  <a:cxn ang="0">
+                    <a:pos x="connsiteX31" y="connsiteY31"/>
+                  </a:cxn>
+                  <a:cxn ang="0">
+                    <a:pos x="connsiteX32" y="connsiteY32"/>
+                  </a:cxn>
+                  <a:cxn ang="0">
+                    <a:pos x="connsiteX33" y="connsiteY33"/>
+                  </a:cxn>
+                  <a:cxn ang="0">
+                    <a:pos x="connsiteX34" y="connsiteY34"/>
+                  </a:cxn>
+                  <a:cxn ang="0">
+                    <a:pos x="connsiteX35" y="connsiteY35"/>
+                  </a:cxn>
+                  <a:cxn ang="0">
+                    <a:pos x="connsiteX36" y="connsiteY36"/>
+                  </a:cxn>
+                  <a:cxn ang="0">
+                    <a:pos x="connsiteX37" y="connsiteY37"/>
+                  </a:cxn>
+                  <a:cxn ang="0">
+                    <a:pos x="connsiteX38" y="connsiteY38"/>
+                  </a:cxn>
+                  <a:cxn ang="0">
+                    <a:pos x="connsiteX39" y="connsiteY39"/>
+                  </a:cxn>
+                  <a:cxn ang="0">
+                    <a:pos x="connsiteX40" y="connsiteY40"/>
+                  </a:cxn>
+                  <a:cxn ang="0">
+                    <a:pos x="connsiteX41" y="connsiteY41"/>
+                  </a:cxn>
+                  <a:cxn ang="0">
+                    <a:pos x="connsiteX42" y="connsiteY42"/>
+                  </a:cxn>
+                  <a:cxn ang="0">
+                    <a:pos x="connsiteX43" y="connsiteY43"/>
+                  </a:cxn>
+                  <a:cxn ang="0">
+                    <a:pos x="connsiteX44" y="connsiteY44"/>
+                  </a:cxn>
+                  <a:cxn ang="0">
+                    <a:pos x="connsiteX45" y="connsiteY45"/>
+                  </a:cxn>
+                  <a:cxn ang="0">
+                    <a:pos x="connsiteX46" y="connsiteY46"/>
+                  </a:cxn>
+                  <a:cxn ang="0">
+                    <a:pos x="connsiteX47" y="connsiteY47"/>
+                  </a:cxn>
+                </a:cxnLst>
+                <a:rect l="l" t="t" r="r" b="b"/>
+                <a:pathLst>
+                  <a:path w="5052291" h="5052291">
+                    <a:moveTo>
+                      <a:pt x="0" y="2752437"/>
+                    </a:moveTo>
+                    <a:lnTo>
+                      <a:pt x="0" y="2299856"/>
+                    </a:lnTo>
+                    <a:lnTo>
+                      <a:pt x="472461" y="2299856"/>
+                    </a:lnTo>
+                    <a:lnTo>
+                      <a:pt x="501490" y="2109648"/>
+                    </a:lnTo>
+                    <a:cubicBezTo>
+                      <a:pt x="556549" y="1840581"/>
+                      <a:pt x="663897" y="1590561"/>
+                      <a:pt x="812453" y="1370670"/>
+                    </a:cubicBezTo>
+                    <a:lnTo>
+                      <a:pt x="914363" y="1234388"/>
+                    </a:lnTo>
+                    <a:lnTo>
+                      <a:pt x="579878" y="899903"/>
+                    </a:lnTo>
+                    <a:lnTo>
+                      <a:pt x="899901" y="579880"/>
+                    </a:lnTo>
+                    <a:lnTo>
+                      <a:pt x="1234386" y="914365"/>
+                    </a:lnTo>
+                    <a:lnTo>
+                      <a:pt x="1370665" y="812457"/>
+                    </a:lnTo>
+                    <a:cubicBezTo>
+                      <a:pt x="1618044" y="645332"/>
+                      <a:pt x="1903552" y="530360"/>
+                      <a:pt x="2211414" y="483320"/>
+                    </a:cubicBezTo>
+                    <a:lnTo>
+                      <a:pt x="2299856" y="473218"/>
+                    </a:lnTo>
+                    <a:lnTo>
+                      <a:pt x="2299856" y="0"/>
+                    </a:lnTo>
+                    <a:lnTo>
+                      <a:pt x="2752437" y="0"/>
+                    </a:lnTo>
+                    <a:lnTo>
+                      <a:pt x="2752437" y="473250"/>
+                    </a:lnTo>
+                    <a:lnTo>
+                      <a:pt x="2847283" y="484310"/>
+                    </a:lnTo>
+                    <a:cubicBezTo>
+                      <a:pt x="3161241" y="533293"/>
+                      <a:pt x="3451791" y="652952"/>
+                      <a:pt x="3702148" y="826505"/>
+                    </a:cubicBezTo>
+                    <a:lnTo>
+                      <a:pt x="3818024" y="914244"/>
+                    </a:lnTo>
+                    <a:lnTo>
+                      <a:pt x="4152388" y="579881"/>
+                    </a:lnTo>
+                    <a:lnTo>
+                      <a:pt x="4472411" y="899904"/>
+                    </a:lnTo>
+                    <a:lnTo>
+                      <a:pt x="4137477" y="1234838"/>
+                    </a:lnTo>
+                    <a:lnTo>
+                      <a:pt x="4196975" y="1309629"/>
+                    </a:lnTo>
+                    <a:cubicBezTo>
+                      <a:pt x="4367803" y="1543850"/>
+                      <a:pt x="4490576" y="1815356"/>
+                      <a:pt x="4550797" y="2109648"/>
+                    </a:cubicBezTo>
+                    <a:lnTo>
+                      <a:pt x="4579826" y="2299856"/>
+                    </a:lnTo>
+                    <a:lnTo>
+                      <a:pt x="5052291" y="2299856"/>
+                    </a:lnTo>
+                    <a:lnTo>
+                      <a:pt x="5052291" y="2752437"/>
+                    </a:lnTo>
+                    <a:lnTo>
+                      <a:pt x="4579826" y="2752437"/>
+                    </a:lnTo>
+                    <a:lnTo>
+                      <a:pt x="4550797" y="2942648"/>
+                    </a:lnTo>
+                    <a:cubicBezTo>
+                      <a:pt x="4495738" y="3211715"/>
+                      <a:pt x="4388390" y="3461734"/>
+                      <a:pt x="4239834" y="3681626"/>
+                    </a:cubicBezTo>
+                    <a:lnTo>
+                      <a:pt x="4137926" y="3817906"/>
+                    </a:lnTo>
+                    <a:lnTo>
+                      <a:pt x="4472410" y="4152390"/>
+                    </a:lnTo>
+                    <a:lnTo>
+                      <a:pt x="4152387" y="4472413"/>
+                    </a:lnTo>
+                    <a:lnTo>
+                      <a:pt x="3817903" y="4137929"/>
+                    </a:lnTo>
+                    <a:lnTo>
+                      <a:pt x="3681621" y="4239839"/>
+                    </a:lnTo>
+                    <a:cubicBezTo>
+                      <a:pt x="3434243" y="4406964"/>
+                      <a:pt x="3148734" y="4521935"/>
+                      <a:pt x="2840872" y="4568976"/>
+                    </a:cubicBezTo>
+                    <a:lnTo>
+                      <a:pt x="2752437" y="4579077"/>
+                    </a:lnTo>
+                    <a:lnTo>
+                      <a:pt x="2752437" y="5052291"/>
+                    </a:lnTo>
+                    <a:lnTo>
+                      <a:pt x="2299856" y="5052291"/>
+                    </a:lnTo>
+                    <a:lnTo>
+                      <a:pt x="2299856" y="4579047"/>
+                    </a:lnTo>
+                    <a:lnTo>
+                      <a:pt x="2205004" y="4567986"/>
+                    </a:lnTo>
+                    <a:cubicBezTo>
+                      <a:pt x="1891045" y="4519003"/>
+                      <a:pt x="1600496" y="4399344"/>
+                      <a:pt x="1350139" y="4225791"/>
+                    </a:cubicBezTo>
+                    <a:lnTo>
+                      <a:pt x="1234263" y="4138052"/>
+                    </a:lnTo>
+                    <a:lnTo>
+                      <a:pt x="899902" y="4472414"/>
+                    </a:lnTo>
+                    <a:lnTo>
+                      <a:pt x="579879" y="4152391"/>
+                    </a:lnTo>
+                    <a:lnTo>
+                      <a:pt x="914811" y="3817459"/>
+                    </a:lnTo>
+                    <a:lnTo>
+                      <a:pt x="855312" y="3742667"/>
+                    </a:lnTo>
+                    <a:cubicBezTo>
+                      <a:pt x="684484" y="3508446"/>
+                      <a:pt x="561711" y="3236940"/>
+                      <a:pt x="501490" y="2942648"/>
+                    </a:cubicBezTo>
+                    <a:lnTo>
+                      <a:pt x="472461" y="2752437"/>
+                    </a:lnTo>
+                    <a:close/>
+                  </a:path>
+                </a:pathLst>
+              </a:custGeom>
+              <a:solidFill>
+                <a:schemeClr val="bg1">
+                  <a:lumMod val="75000"/>
+                </a:schemeClr>
+              </a:solidFill>
+              <a:ln w="76200">
+                <a:solidFill>
+                  <a:schemeClr val="tx1"/>
+                </a:solidFill>
+              </a:ln>
+            </p:spPr>
+            <p:style>
+              <a:lnRef idx="2">
+                <a:schemeClr val="accent1">
+                  <a:shade val="50000"/>
+                </a:schemeClr>
+              </a:lnRef>
+              <a:fillRef idx="1">
+                <a:schemeClr val="accent1"/>
+              </a:fillRef>
+              <a:effectRef idx="0">
+                <a:schemeClr val="accent1"/>
+              </a:effectRef>
+              <a:fontRef idx="minor">
+                <a:schemeClr val="lt1"/>
+              </a:fontRef>
+            </p:style>
+            <p:txBody>
+              <a:bodyPr rtlCol="0" anchor="ctr"/>
+              <a:lstStyle/>
+              <a:p>
+                <a:pPr algn="ctr"/>
+                <a:endParaRPr lang="ko-KR" altLang="en-US"/>
+              </a:p>
+            </p:txBody>
+          </p:sp>
+          <p:sp>
+            <p:nvSpPr>
+              <p:cNvPr id="11" name="타원 10"/>
+              <p:cNvSpPr/>
+              <p:nvPr/>
+            </p:nvSpPr>
+            <p:spPr>
+              <a:xfrm>
+                <a:off x="4461158" y="1794157"/>
+                <a:ext cx="3269678" cy="3269678"/>
+              </a:xfrm>
+              <a:prstGeom prst="ellipse">
+                <a:avLst/>
+              </a:prstGeom>
+              <a:solidFill>
+                <a:schemeClr val="bg1">
+                  <a:lumMod val="50000"/>
+                </a:schemeClr>
+              </a:solidFill>
+              <a:ln>
+                <a:noFill/>
+              </a:ln>
+            </p:spPr>
+            <p:style>
+              <a:lnRef idx="2">
+                <a:schemeClr val="accent1">
+                  <a:shade val="50000"/>
+                </a:schemeClr>
+              </a:lnRef>
+              <a:fillRef idx="1">
+                <a:schemeClr val="accent1"/>
+              </a:fillRef>
+              <a:effectRef idx="0">
+                <a:schemeClr val="accent1"/>
+              </a:effectRef>
+              <a:fontRef idx="minor">
+                <a:schemeClr val="lt1"/>
+              </a:fontRef>
+            </p:style>
+            <p:txBody>
+              <a:bodyPr rtlCol="0" anchor="ctr"/>
+              <a:lstStyle/>
+              <a:p>
+                <a:pPr algn="ctr"/>
+                <a:endParaRPr lang="ko-KR" altLang="en-US"/>
+              </a:p>
+            </p:txBody>
+          </p:sp>
+          <p:sp>
+            <p:nvSpPr>
+              <p:cNvPr id="12" name="타원 11"/>
+              <p:cNvSpPr/>
+              <p:nvPr/>
+            </p:nvSpPr>
+            <p:spPr>
+              <a:xfrm>
+                <a:off x="4941447" y="2274446"/>
+                <a:ext cx="2309098" cy="2309098"/>
+              </a:xfrm>
+              <a:prstGeom prst="ellipse">
+                <a:avLst/>
+              </a:prstGeom>
+              <a:solidFill>
+                <a:schemeClr val="bg1">
+                  <a:lumMod val="75000"/>
+                </a:schemeClr>
+              </a:solidFill>
+              <a:ln>
+                <a:noFill/>
+              </a:ln>
+            </p:spPr>
+            <p:style>
+              <a:lnRef idx="2">
+                <a:schemeClr val="accent1">
+                  <a:shade val="50000"/>
+                </a:schemeClr>
+              </a:lnRef>
+              <a:fillRef idx="1">
+                <a:schemeClr val="accent1"/>
+              </a:fillRef>
+              <a:effectRef idx="0">
+                <a:schemeClr val="accent1"/>
+              </a:effectRef>
+              <a:fontRef idx="minor">
+                <a:schemeClr val="lt1"/>
+              </a:fontRef>
+            </p:style>
+            <p:txBody>
+              <a:bodyPr rtlCol="0" anchor="ctr"/>
+              <a:lstStyle/>
+              <a:p>
+                <a:pPr algn="ctr"/>
+                <a:endParaRPr lang="ko-KR" altLang="en-US"/>
+              </a:p>
+            </p:txBody>
+          </p:sp>
+          <p:sp>
+            <p:nvSpPr>
+              <p:cNvPr id="13" name="타원 12"/>
+              <p:cNvSpPr/>
+              <p:nvPr/>
+            </p:nvSpPr>
+            <p:spPr>
+              <a:xfrm>
+                <a:off x="5403265" y="2736264"/>
+                <a:ext cx="1385462" cy="1385462"/>
+              </a:xfrm>
+              <a:prstGeom prst="ellipse">
+                <a:avLst/>
+              </a:prstGeom>
+              <a:solidFill>
+                <a:schemeClr val="tx1">
+                  <a:lumMod val="75000"/>
+                  <a:lumOff val="25000"/>
+                </a:schemeClr>
+              </a:solidFill>
+              <a:ln>
+                <a:noFill/>
+              </a:ln>
+            </p:spPr>
+            <p:style>
+              <a:lnRef idx="2">
+                <a:schemeClr val="accent1">
+                  <a:shade val="50000"/>
+                </a:schemeClr>
+              </a:lnRef>
+              <a:fillRef idx="1">
+                <a:schemeClr val="accent1"/>
+              </a:fillRef>
+              <a:effectRef idx="0">
+                <a:schemeClr val="accent1"/>
+              </a:effectRef>
+              <a:fontRef idx="minor">
+                <a:schemeClr val="lt1"/>
+              </a:fontRef>
+            </p:style>
+            <p:txBody>
+              <a:bodyPr rtlCol="0" anchor="ctr"/>
+              <a:lstStyle/>
+              <a:p>
+                <a:pPr algn="ctr"/>
+                <a:endParaRPr lang="ko-KR" altLang="en-US"/>
+              </a:p>
+            </p:txBody>
+          </p:sp>
+        </p:grpSp>
+      </p:grpSp>
+    </p:spTree>
+    <p:extLst>
+      <p:ext uri="{BB962C8B-B14F-4D97-AF65-F5344CB8AC3E}">
+        <p14:creationId xmlns:p14="http://schemas.microsoft.com/office/powerpoint/2010/main" val="818890390"/>
+      </p:ext>
+    </p:extLst>
+  </p:cSld>
+  <p:clrMapOvr>
+    <a:masterClrMapping/>
+  </p:clrMapOvr>
+</p:sld>
+</file>
+
 <file path=ppt/theme/theme1.xml><?xml version="1.0" encoding="utf-8"?>
 <a:theme xmlns:a="http://schemas.openxmlformats.org/drawingml/2006/main" name="Office 테마">
   <a:themeElements>

</xml_diff>